<commit_message>
Turn in Briefing 7
</commit_message>
<xml_diff>
--- a/Briefings/Briefing7.pptx
+++ b/Briefings/Briefing7.pptx
@@ -8,12 +8,13 @@
     <p:sldId id="256" r:id="rId2"/>
     <p:sldId id="258" r:id="rId3"/>
     <p:sldId id="259" r:id="rId4"/>
-    <p:sldId id="260" r:id="rId5"/>
-    <p:sldId id="261" r:id="rId6"/>
-    <p:sldId id="262" r:id="rId7"/>
-    <p:sldId id="263" r:id="rId8"/>
-    <p:sldId id="264" r:id="rId9"/>
-    <p:sldId id="257" r:id="rId10"/>
+    <p:sldId id="265" r:id="rId5"/>
+    <p:sldId id="260" r:id="rId6"/>
+    <p:sldId id="261" r:id="rId7"/>
+    <p:sldId id="262" r:id="rId8"/>
+    <p:sldId id="263" r:id="rId9"/>
+    <p:sldId id="264" r:id="rId10"/>
+    <p:sldId id="257" r:id="rId11"/>
   </p:sldIdLst>
   <p:sldSz cx="9144000" cy="6858000" type="screen4x3"/>
   <p:notesSz cx="6858000" cy="9144000"/>
@@ -323,7 +324,7 @@
             <a:fld id="{542ED6D8-967B-4FDD-8539-23116DD8CE38}" type="datetimeFigureOut">
               <a:rPr lang="en-US" smtClean="0"/>
               <a:pPr/>
-              <a:t>1/18/2015</a:t>
+              <a:t>1/20/2015</a:t>
             </a:fld>
             <a:endParaRPr lang="en-US"/>
           </a:p>
@@ -519,7 +520,7 @@
             <a:fld id="{542ED6D8-967B-4FDD-8539-23116DD8CE38}" type="datetimeFigureOut">
               <a:rPr lang="en-US" smtClean="0"/>
               <a:pPr/>
-              <a:t>1/18/2015</a:t>
+              <a:t>1/20/2015</a:t>
             </a:fld>
             <a:endParaRPr lang="en-US"/>
           </a:p>
@@ -709,7 +710,7 @@
             <a:fld id="{542ED6D8-967B-4FDD-8539-23116DD8CE38}" type="datetimeFigureOut">
               <a:rPr lang="en-US" smtClean="0"/>
               <a:pPr/>
-              <a:t>1/18/2015</a:t>
+              <a:t>1/20/2015</a:t>
             </a:fld>
             <a:endParaRPr lang="en-US"/>
           </a:p>
@@ -940,7 +941,7 @@
             <a:fld id="{542ED6D8-967B-4FDD-8539-23116DD8CE38}" type="datetimeFigureOut">
               <a:rPr lang="en-US" smtClean="0"/>
               <a:pPr/>
-              <a:t>1/18/2015</a:t>
+              <a:t>1/20/2015</a:t>
             </a:fld>
             <a:endParaRPr lang="en-US"/>
           </a:p>
@@ -1223,7 +1224,7 @@
             <a:fld id="{542ED6D8-967B-4FDD-8539-23116DD8CE38}" type="datetimeFigureOut">
               <a:rPr lang="en-US" smtClean="0"/>
               <a:pPr/>
-              <a:t>1/18/2015</a:t>
+              <a:t>1/20/2015</a:t>
             </a:fld>
             <a:endParaRPr lang="en-US"/>
           </a:p>
@@ -1513,7 +1514,7 @@
             <a:fld id="{542ED6D8-967B-4FDD-8539-23116DD8CE38}" type="datetimeFigureOut">
               <a:rPr lang="en-US" smtClean="0"/>
               <a:pPr/>
-              <a:t>1/18/2015</a:t>
+              <a:t>1/20/2015</a:t>
             </a:fld>
             <a:endParaRPr lang="en-US"/>
           </a:p>
@@ -2069,7 +2070,7 @@
             <a:fld id="{542ED6D8-967B-4FDD-8539-23116DD8CE38}" type="datetimeFigureOut">
               <a:rPr lang="en-US" smtClean="0"/>
               <a:pPr/>
-              <a:t>1/18/2015</a:t>
+              <a:t>1/20/2015</a:t>
             </a:fld>
             <a:endParaRPr lang="en-US"/>
           </a:p>
@@ -2202,7 +2203,7 @@
             <a:fld id="{542ED6D8-967B-4FDD-8539-23116DD8CE38}" type="datetimeFigureOut">
               <a:rPr lang="en-US" smtClean="0"/>
               <a:pPr/>
-              <a:t>1/18/2015</a:t>
+              <a:t>1/20/2015</a:t>
             </a:fld>
             <a:endParaRPr lang="en-US"/>
           </a:p>
@@ -2354,7 +2355,7 @@
             <a:fld id="{542ED6D8-967B-4FDD-8539-23116DD8CE38}" type="datetimeFigureOut">
               <a:rPr lang="en-US" smtClean="0"/>
               <a:pPr/>
-              <a:t>1/18/2015</a:t>
+              <a:t>1/20/2015</a:t>
             </a:fld>
             <a:endParaRPr lang="en-US"/>
           </a:p>
@@ -2677,7 +2678,7 @@
             <a:fld id="{542ED6D8-967B-4FDD-8539-23116DD8CE38}" type="datetimeFigureOut">
               <a:rPr lang="en-US" smtClean="0"/>
               <a:pPr/>
-              <a:t>1/18/2015</a:t>
+              <a:t>1/20/2015</a:t>
             </a:fld>
             <a:endParaRPr lang="en-US"/>
           </a:p>
@@ -2976,7 +2977,7 @@
             <a:fld id="{542ED6D8-967B-4FDD-8539-23116DD8CE38}" type="datetimeFigureOut">
               <a:rPr lang="en-US" smtClean="0"/>
               <a:pPr/>
-              <a:t>1/18/2015</a:t>
+              <a:t>1/20/2015</a:t>
             </a:fld>
             <a:endParaRPr lang="en-US"/>
           </a:p>
@@ -3223,7 +3224,7 @@
             <a:fld id="{542ED6D8-967B-4FDD-8539-23116DD8CE38}" type="datetimeFigureOut">
               <a:rPr lang="en-US" smtClean="0"/>
               <a:pPr/>
-              <a:t>1/18/2015</a:t>
+              <a:t>1/20/2015</a:t>
             </a:fld>
             <a:endParaRPr lang="en-US"/>
           </a:p>
@@ -3814,6 +3815,112 @@
 </p:sld>
 </file>
 
+<file path=ppt/slides/slide10.xml><?xml version="1.0" encoding="utf-8"?>
+<p:sld xmlns:a="http://schemas.openxmlformats.org/drawingml/2006/main" xmlns:r="http://schemas.openxmlformats.org/officeDocument/2006/relationships" xmlns:p="http://schemas.openxmlformats.org/presentationml/2006/main">
+  <p:cSld>
+    <p:spTree>
+      <p:nvGrpSpPr>
+        <p:cNvPr id="1" name=""/>
+        <p:cNvGrpSpPr/>
+        <p:nvPr/>
+      </p:nvGrpSpPr>
+      <p:grpSpPr>
+        <a:xfrm>
+          <a:off x="0" y="0"/>
+          <a:ext cx="0" cy="0"/>
+          <a:chOff x="0" y="0"/>
+          <a:chExt cx="0" cy="0"/>
+        </a:xfrm>
+      </p:grpSpPr>
+      <p:sp>
+        <p:nvSpPr>
+          <p:cNvPr id="2" name="Title 1"/>
+          <p:cNvSpPr>
+            <a:spLocks noGrp="1"/>
+          </p:cNvSpPr>
+          <p:nvPr>
+            <p:ph type="title"/>
+          </p:nvPr>
+        </p:nvSpPr>
+        <p:spPr/>
+        <p:txBody>
+          <a:bodyPr/>
+          <a:lstStyle/>
+          <a:p>
+            <a:pPr algn="ctr"/>
+            <a:r>
+              <a:rPr lang="en-US" dirty="0" smtClean="0"/>
+              <a:t>Where We’re Going</a:t>
+            </a:r>
+            <a:endParaRPr lang="en-US" dirty="0"/>
+          </a:p>
+        </p:txBody>
+      </p:sp>
+      <p:sp>
+        <p:nvSpPr>
+          <p:cNvPr id="3" name="Content Placeholder 2"/>
+          <p:cNvSpPr>
+            <a:spLocks noGrp="1"/>
+          </p:cNvSpPr>
+          <p:nvPr>
+            <p:ph idx="1"/>
+          </p:nvPr>
+        </p:nvSpPr>
+        <p:spPr/>
+        <p:txBody>
+          <a:bodyPr/>
+          <a:lstStyle/>
+          <a:p>
+            <a:r>
+              <a:rPr lang="en-US" dirty="0" smtClean="0"/>
+              <a:t>Meet with the client and Team 4 (January 28</a:t>
+            </a:r>
+            <a:r>
+              <a:rPr lang="en-US" baseline="30000" dirty="0" smtClean="0"/>
+              <a:t>th</a:t>
+            </a:r>
+            <a:r>
+              <a:rPr lang="en-US" dirty="0" smtClean="0"/>
+              <a:t>)</a:t>
+            </a:r>
+          </a:p>
+          <a:p>
+            <a:pPr lvl="1"/>
+            <a:r>
+              <a:rPr lang="en-US" dirty="0" smtClean="0"/>
+              <a:t>Demo and feedback</a:t>
+            </a:r>
+          </a:p>
+          <a:p>
+            <a:pPr lvl="1"/>
+            <a:r>
+              <a:rPr lang="en-US" dirty="0" smtClean="0"/>
+              <a:t>Get a tablet for testing</a:t>
+            </a:r>
+          </a:p>
+          <a:p>
+            <a:r>
+              <a:rPr lang="en-US" dirty="0" smtClean="0"/>
+              <a:t>Complete the UI flow</a:t>
+            </a:r>
+          </a:p>
+          <a:p>
+            <a:r>
+              <a:rPr lang="en-US" dirty="0" smtClean="0"/>
+              <a:t>Figure out a way to test the JSON</a:t>
+            </a:r>
+            <a:endParaRPr lang="en-US" dirty="0"/>
+          </a:p>
+        </p:txBody>
+      </p:sp>
+    </p:spTree>
+  </p:cSld>
+  <p:clrMapOvr>
+    <a:masterClrMapping/>
+  </p:clrMapOvr>
+</p:sld>
+</file>
+
 <file path=ppt/slides/slide2.xml><?xml version="1.0" encoding="utf-8"?>
 <p:sld xmlns:a="http://schemas.openxmlformats.org/drawingml/2006/main" xmlns:r="http://schemas.openxmlformats.org/officeDocument/2006/relationships" xmlns:p="http://schemas.openxmlformats.org/presentationml/2006/main">
   <p:cSld>
@@ -4027,21 +4134,23 @@
         </p:nvSpPr>
         <p:spPr/>
         <p:txBody>
-          <a:bodyPr/>
+          <a:bodyPr>
+            <a:normAutofit/>
+          </a:bodyPr>
           <a:lstStyle/>
           <a:p>
             <a:pPr algn="ctr"/>
             <a:r>
-              <a:rPr lang="en-US" dirty="0" smtClean="0"/>
-              <a:t>Change Complete Trip Flow</a:t>
-            </a:r>
-            <a:endParaRPr lang="en-US" dirty="0"/>
+              <a:rPr lang="en-US" sz="3400" dirty="0" smtClean="0"/>
+              <a:t>Restrict Keyboard to Alpha-Numerical </a:t>
+            </a:r>
+            <a:endParaRPr lang="en-US" sz="3400" dirty="0"/>
           </a:p>
         </p:txBody>
       </p:sp>
       <p:pic>
         <p:nvPicPr>
-          <p:cNvPr id="4" name="Content Placeholder 3" descr="Screenshot (20).png"/>
+          <p:cNvPr id="4" name="Content Placeholder 3" descr="Screenshot (24).png"/>
           <p:cNvPicPr>
             <a:picLocks noGrp="1" noChangeAspect="1"/>
           </p:cNvPicPr>
@@ -4051,41 +4160,15 @@
         </p:nvPicPr>
         <p:blipFill>
           <a:blip r:embed="rId2" cstate="print"/>
-          <a:srcRect b="59155"/>
           <a:stretch>
             <a:fillRect/>
           </a:stretch>
         </p:blipFill>
         <p:spPr>
           <a:xfrm>
-            <a:off x="7055" y="1752600"/>
-            <a:ext cx="9136945" cy="2209800"/>
-          </a:xfrm>
-        </p:spPr>
-      </p:pic>
-      <p:pic>
-        <p:nvPicPr>
-          <p:cNvPr id="5" name="Picture 4" descr="Screenshot (21).png"/>
-          <p:cNvPicPr>
-            <a:picLocks noChangeAspect="1"/>
-          </p:cNvPicPr>
-          <p:nvPr/>
-        </p:nvPicPr>
-        <p:blipFill>
-          <a:blip r:embed="rId3" cstate="print"/>
-          <a:srcRect b="58889"/>
-          <a:stretch>
-            <a:fillRect/>
-          </a:stretch>
-        </p:blipFill>
-        <p:spPr>
-          <a:xfrm>
-            <a:off x="0" y="4419600"/>
-            <a:ext cx="9144000" cy="2114550"/>
-          </a:xfrm>
-          <a:prstGeom prst="rect">
-            <a:avLst/>
-          </a:prstGeom>
+            <a:off x="-2821" y="1447800"/>
+            <a:ext cx="9146821" cy="5410200"/>
+          </a:xfrm>
         </p:spPr>
       </p:pic>
     </p:spTree>
@@ -4125,15 +4208,13 @@
         </p:nvSpPr>
         <p:spPr/>
         <p:txBody>
-          <a:bodyPr>
-            <a:normAutofit fontScale="90000"/>
-          </a:bodyPr>
+          <a:bodyPr/>
           <a:lstStyle/>
           <a:p>
             <a:pPr algn="ctr"/>
             <a:r>
               <a:rPr lang="en-US" dirty="0" smtClean="0"/>
-              <a:t>Day Summary Added at Runtime</a:t>
+              <a:t>Change Complete Trip Flow</a:t>
             </a:r>
             <a:endParaRPr lang="en-US" dirty="0"/>
           </a:p>
@@ -4141,7 +4222,7 @@
       </p:sp>
       <p:pic>
         <p:nvPicPr>
-          <p:cNvPr id="4" name="Content Placeholder 3" descr="Screenshot (22).png"/>
+          <p:cNvPr id="4" name="Content Placeholder 3" descr="Screenshot (20).png"/>
           <p:cNvPicPr>
             <a:picLocks noGrp="1" noChangeAspect="1"/>
           </p:cNvPicPr>
@@ -4151,15 +4232,41 @@
         </p:nvPicPr>
         <p:blipFill>
           <a:blip r:embed="rId2" cstate="print"/>
+          <a:srcRect b="59155"/>
           <a:stretch>
             <a:fillRect/>
           </a:stretch>
         </p:blipFill>
         <p:spPr>
           <a:xfrm>
-            <a:off x="0" y="1524000"/>
-            <a:ext cx="9144000" cy="5334000"/>
-          </a:xfrm>
+            <a:off x="7055" y="1752600"/>
+            <a:ext cx="9136945" cy="2209800"/>
+          </a:xfrm>
+        </p:spPr>
+      </p:pic>
+      <p:pic>
+        <p:nvPicPr>
+          <p:cNvPr id="5" name="Picture 4" descr="Screenshot (21).png"/>
+          <p:cNvPicPr>
+            <a:picLocks noChangeAspect="1"/>
+          </p:cNvPicPr>
+          <p:nvPr/>
+        </p:nvPicPr>
+        <p:blipFill>
+          <a:blip r:embed="rId3" cstate="print"/>
+          <a:srcRect b="58889"/>
+          <a:stretch>
+            <a:fillRect/>
+          </a:stretch>
+        </p:blipFill>
+        <p:spPr>
+          <a:xfrm>
+            <a:off x="0" y="4419600"/>
+            <a:ext cx="9144000" cy="2114550"/>
+          </a:xfrm>
+          <a:prstGeom prst="rect">
+            <a:avLst/>
+          </a:prstGeom>
         </p:spPr>
       </p:pic>
     </p:spTree>
@@ -4199,13 +4306,15 @@
         </p:nvSpPr>
         <p:spPr/>
         <p:txBody>
-          <a:bodyPr/>
+          <a:bodyPr>
+            <a:normAutofit fontScale="90000"/>
+          </a:bodyPr>
           <a:lstStyle/>
           <a:p>
             <a:pPr algn="ctr"/>
             <a:r>
               <a:rPr lang="en-US" dirty="0" smtClean="0"/>
-              <a:t>End Day Control</a:t>
+              <a:t>Day Summary Added at Runtime</a:t>
             </a:r>
             <a:endParaRPr lang="en-US" dirty="0"/>
           </a:p>
@@ -4213,7 +4322,7 @@
       </p:sp>
       <p:pic>
         <p:nvPicPr>
-          <p:cNvPr id="4" name="Content Placeholder 3" descr="Screenshot (23).png"/>
+          <p:cNvPr id="4" name="Content Placeholder 3" descr="Screenshot (22).png"/>
           <p:cNvPicPr>
             <a:picLocks noGrp="1" noChangeAspect="1"/>
           </p:cNvPicPr>
@@ -4229,8 +4338,8 @@
         </p:blipFill>
         <p:spPr>
           <a:xfrm>
-            <a:off x="0" y="1447800"/>
-            <a:ext cx="9144000" cy="5410200"/>
+            <a:off x="0" y="1524000"/>
+            <a:ext cx="9144000" cy="5334000"/>
           </a:xfrm>
         </p:spPr>
       </p:pic>
@@ -4277,7 +4386,7 @@
             <a:pPr algn="ctr"/>
             <a:r>
               <a:rPr lang="en-US" dirty="0" smtClean="0"/>
-              <a:t>File Structure</a:t>
+              <a:t>End Day Control</a:t>
             </a:r>
             <a:endParaRPr lang="en-US" dirty="0"/>
           </a:p>
@@ -4285,9 +4394,9 @@
       </p:sp>
       <p:pic>
         <p:nvPicPr>
-          <p:cNvPr id="30722" name="Picture 2"/>
+          <p:cNvPr id="4" name="Content Placeholder 3" descr="Screenshot (23).png"/>
           <p:cNvPicPr>
-            <a:picLocks noGrp="1" noChangeAspect="1" noChangeArrowheads="1"/>
+            <a:picLocks noGrp="1" noChangeAspect="1"/>
           </p:cNvPicPr>
           <p:nvPr>
             <p:ph idx="1"/>
@@ -4295,26 +4404,15 @@
         </p:nvPicPr>
         <p:blipFill>
           <a:blip r:embed="rId2" cstate="print"/>
-          <a:srcRect/>
           <a:stretch>
             <a:fillRect/>
           </a:stretch>
         </p:blipFill>
-        <p:spPr bwMode="auto">
-          <a:xfrm>
-            <a:off x="304800" y="1777979"/>
-            <a:ext cx="8475174" cy="4546621"/>
-          </a:xfrm>
-          <a:prstGeom prst="rect">
-            <a:avLst/>
-          </a:prstGeom>
-          <a:noFill/>
-          <a:ln w="9525">
-            <a:noFill/>
-            <a:miter lim="800000"/>
-            <a:headEnd/>
-            <a:tailEnd/>
-          </a:ln>
+        <p:spPr>
+          <a:xfrm>
+            <a:off x="0" y="1447800"/>
+            <a:ext cx="9144000" cy="5410200"/>
+          </a:xfrm>
         </p:spPr>
       </p:pic>
     </p:spTree>
@@ -4360,7 +4458,7 @@
             <a:pPr algn="ctr"/>
             <a:r>
               <a:rPr lang="en-US" dirty="0" smtClean="0"/>
-              <a:t>CSV Format Draft</a:t>
+              <a:t>File Structure</a:t>
             </a:r>
             <a:endParaRPr lang="en-US" dirty="0"/>
           </a:p>
@@ -4368,7 +4466,7 @@
       </p:sp>
       <p:pic>
         <p:nvPicPr>
-          <p:cNvPr id="31746" name="Picture 2"/>
+          <p:cNvPr id="30722" name="Picture 2"/>
           <p:cNvPicPr>
             <a:picLocks noGrp="1" noChangeAspect="1" noChangeArrowheads="1"/>
           </p:cNvPicPr>
@@ -4385,8 +4483,8 @@
         </p:blipFill>
         <p:spPr bwMode="auto">
           <a:xfrm>
-            <a:off x="1762653" y="2055590"/>
-            <a:ext cx="5618695" cy="4040410"/>
+            <a:off x="304800" y="1777979"/>
+            <a:ext cx="8475174" cy="4546621"/>
           </a:xfrm>
           <a:prstGeom prst="rect">
             <a:avLst/>
@@ -4443,69 +4541,46 @@
             <a:pPr algn="ctr"/>
             <a:r>
               <a:rPr lang="en-US" dirty="0" smtClean="0"/>
-              <a:t>Where We’re Going</a:t>
+              <a:t>CSV Format Draft</a:t>
             </a:r>
             <a:endParaRPr lang="en-US" dirty="0"/>
           </a:p>
         </p:txBody>
       </p:sp>
-      <p:sp>
-        <p:nvSpPr>
-          <p:cNvPr id="3" name="Content Placeholder 2"/>
-          <p:cNvSpPr>
-            <a:spLocks noGrp="1"/>
-          </p:cNvSpPr>
+      <p:pic>
+        <p:nvPicPr>
+          <p:cNvPr id="31746" name="Picture 2"/>
+          <p:cNvPicPr>
+            <a:picLocks noGrp="1" noChangeAspect="1" noChangeArrowheads="1"/>
+          </p:cNvPicPr>
           <p:nvPr>
             <p:ph idx="1"/>
           </p:nvPr>
-        </p:nvSpPr>
-        <p:spPr/>
-        <p:txBody>
-          <a:bodyPr/>
-          <a:lstStyle/>
-          <a:p>
-            <a:r>
-              <a:rPr lang="en-US" dirty="0" smtClean="0"/>
-              <a:t>Meet with the client and Team 4 (January 28</a:t>
-            </a:r>
-            <a:r>
-              <a:rPr lang="en-US" baseline="30000" dirty="0" smtClean="0"/>
-              <a:t>th</a:t>
-            </a:r>
-            <a:r>
-              <a:rPr lang="en-US" dirty="0" smtClean="0"/>
-              <a:t>)</a:t>
-            </a:r>
-          </a:p>
-          <a:p>
-            <a:pPr lvl="1"/>
-            <a:r>
-              <a:rPr lang="en-US" dirty="0" smtClean="0"/>
-              <a:t>Demo and feedback</a:t>
-            </a:r>
-          </a:p>
-          <a:p>
-            <a:pPr lvl="1"/>
-            <a:r>
-              <a:rPr lang="en-US" dirty="0" smtClean="0"/>
-              <a:t>Get a tablet for testing</a:t>
-            </a:r>
-          </a:p>
-          <a:p>
-            <a:r>
-              <a:rPr lang="en-US" dirty="0" smtClean="0"/>
-              <a:t>Complete the UI flow</a:t>
-            </a:r>
-          </a:p>
-          <a:p>
-            <a:r>
-              <a:rPr lang="en-US" dirty="0" smtClean="0"/>
-              <a:t>Figure out a way to test the JSON</a:t>
-            </a:r>
-            <a:endParaRPr lang="en-US" dirty="0"/>
-          </a:p>
-        </p:txBody>
-      </p:sp>
+        </p:nvPicPr>
+        <p:blipFill>
+          <a:blip r:embed="rId2" cstate="print"/>
+          <a:srcRect/>
+          <a:stretch>
+            <a:fillRect/>
+          </a:stretch>
+        </p:blipFill>
+        <p:spPr bwMode="auto">
+          <a:xfrm>
+            <a:off x="1762653" y="2055590"/>
+            <a:ext cx="5618695" cy="4040410"/>
+          </a:xfrm>
+          <a:prstGeom prst="rect">
+            <a:avLst/>
+          </a:prstGeom>
+          <a:noFill/>
+          <a:ln w="9525">
+            <a:noFill/>
+            <a:miter lim="800000"/>
+            <a:headEnd/>
+            <a:tailEnd/>
+          </a:ln>
+        </p:spPr>
+      </p:pic>
     </p:spTree>
   </p:cSld>
   <p:clrMapOvr>

</xml_diff>